<commit_message>
Add Builder example based on Method Chaining
Fix also a useless clone method in the BaseDocument class.
</commit_message>
<xml_diff>
--- a/Lesson.02 - Design Patterns - Creational/Creational.pptx
+++ b/Lesson.02 - Design Patterns - Creational/Creational.pptx
@@ -152,157 +152,6 @@
 </p188:authorLst>
 </file>
 
-<file path=ppt/comments/modernComment_102_913137CC.xml><?xml version="1.0" encoding="utf-8"?>
-<p188:cmLst xmlns:a="http://schemas.openxmlformats.org/drawingml/2006/main" xmlns:r="http://schemas.openxmlformats.org/officeDocument/2006/relationships" xmlns:p188="http://schemas.microsoft.com/office/powerpoint/2018/8/main">
-  <p188:cm id="{5B3B6152-4F41-314B-BD82-08A801924D38}" authorId="{9B3E8C50-9F58-5237-7C41-C721E3BAA428}" created="2025-02-26T19:16:44.880">
-    <pc:sldMkLst xmlns:pc="http://schemas.microsoft.com/office/powerpoint/2013/main/command">
-      <pc:docMk/>
-      <pc:sldMk cId="2435921868" sldId="258"/>
-    </pc:sldMkLst>
-    <p188:replyLst>
-      <p188:reply id="{70AA69A1-64EF-5F45-B83B-0688BB205DCC}" authorId="{9B3E8C50-9F58-5237-7C41-C721E3BAA428}" created="2025-02-26T19:17:08.440">
-        <p188:txBody>
-          <a:bodyPr/>
-          <a:lstStyle/>
-          <a:p>
-            <a:r>
-              <a:rPr lang="en-US"/>
-              <a:t>Interface assumed as a required concept</a:t>
-            </a:r>
-          </a:p>
-        </p188:txBody>
-      </p188:reply>
-      <p188:reply id="{73A9175A-EDF3-0046-937B-2FDBBAF9C188}" authorId="{9B3E8C50-9F58-5237-7C41-C721E3BAA428}" created="2025-02-26T19:17:44.434">
-        <p188:txBody>
-          <a:bodyPr/>
-          <a:lstStyle/>
-          <a:p>
-            <a:r>
-              <a:rPr lang="en-US"/>
-              <a:t>C++/Java Generics</a:t>
-            </a:r>
-          </a:p>
-        </p188:txBody>
-      </p188:reply>
-    </p188:replyLst>
-    <p188:txBody>
-      <a:bodyPr/>
-      <a:lstStyle/>
-      <a:p>
-        <a:r>
-          <a:rPr lang="en-US"/>
-          <a:t>C++ or Java used as languages</a:t>
-        </a:r>
-      </a:p>
-    </p188:txBody>
-  </p188:cm>
-  <p188:cm id="{8ADAE4CF-CD75-B740-90FD-7D154D008FC1}" authorId="{9B3E8C50-9F58-5237-7C41-C721E3BAA428}" created="2025-03-01T13:37:08.033">
-    <pc:sldMkLst xmlns:pc="http://schemas.microsoft.com/office/powerpoint/2013/main/command">
-      <pc:docMk/>
-      <pc:sldMk cId="2435921868" sldId="258"/>
-    </pc:sldMkLst>
-    <p188:txBody>
-      <a:bodyPr/>
-      <a:lstStyle/>
-      <a:p>
-        <a:r>
-          <a:rPr lang="en-US"/>
-          <a:t>Assume no bad references/pointers, no weird coding</a:t>
-        </a:r>
-      </a:p>
-    </p188:txBody>
-  </p188:cm>
-</p188:cmLst>
-</file>
-
-<file path=ppt/comments/modernComment_103_B73FBC7A.xml><?xml version="1.0" encoding="utf-8"?>
-<p188:cmLst xmlns:a="http://schemas.openxmlformats.org/drawingml/2006/main" xmlns:r="http://schemas.openxmlformats.org/officeDocument/2006/relationships" xmlns:p188="http://schemas.microsoft.com/office/powerpoint/2018/8/main">
-  <p188:cm id="{296BAA74-D1BA-314F-9FF5-93396BFDEFF7}" authorId="{9B3E8C50-9F58-5237-7C41-C721E3BAA428}" created="2025-02-26T19:27:55.372">
-    <pc:sldMkLst xmlns:pc="http://schemas.microsoft.com/office/powerpoint/2013/main/command">
-      <pc:docMk/>
-      <pc:sldMk cId="3074407546" sldId="259"/>
-    </pc:sldMkLst>
-    <p188:txBody>
-      <a:bodyPr/>
-      <a:lstStyle/>
-      <a:p>
-        <a:r>
-          <a:rPr lang="en-US"/>
-          <a:t>Polymorphic creation</a:t>
-        </a:r>
-      </a:p>
-    </p188:txBody>
-  </p188:cm>
-</p188:cmLst>
-</file>
-
-<file path=ppt/comments/modernComment_104_53CA7D7B.xml><?xml version="1.0" encoding="utf-8"?>
-<p188:cmLst xmlns:a="http://schemas.openxmlformats.org/drawingml/2006/main" xmlns:r="http://schemas.openxmlformats.org/officeDocument/2006/relationships" xmlns:p188="http://schemas.microsoft.com/office/powerpoint/2018/8/main">
-  <p188:cm id="{BD99344C-D300-C84A-B465-19EF820076F1}" authorId="{9B3E8C50-9F58-5237-7C41-C721E3BAA428}" created="2025-09-23T19:50:28.808">
-    <ac:deMkLst xmlns:ac="http://schemas.microsoft.com/office/drawing/2013/main/command">
-      <pc:docMk xmlns:pc="http://schemas.microsoft.com/office/powerpoint/2013/main/command"/>
-      <pc:sldMk xmlns:pc="http://schemas.microsoft.com/office/powerpoint/2013/main/command" cId="1405779323" sldId="260"/>
-      <ac:spMk id="27" creationId="{1559A79A-016B-7F02-1A8A-E0509A68A6A0}"/>
-    </ac:deMkLst>
-    <p188:txBody>
-      <a:bodyPr/>
-      <a:lstStyle/>
-      <a:p>
-        <a:r>
-          <a:rPr lang="en-US"/>
-          <a:t>Class-creational patterns: Use inheritance to vary the instantiated class (e.g., Factory Method)
-Object-creational patterns: Delegate instantiation to another object (e.g., Abstract Factory, Builder, Prototype, Singleton)</a:t>
-        </a:r>
-      </a:p>
-    </p188:txBody>
-  </p188:cm>
-</p188:cmLst>
-</file>
-
-<file path=ppt/comments/modernComment_10D_A1F13EFF.xml><?xml version="1.0" encoding="utf-8"?>
-<p188:cmLst xmlns:a="http://schemas.openxmlformats.org/drawingml/2006/main" xmlns:r="http://schemas.openxmlformats.org/officeDocument/2006/relationships" xmlns:p188="http://schemas.microsoft.com/office/powerpoint/2018/8/main">
-  <p188:cm id="{748BE078-5AF0-0D45-93EE-51CF30B7DCB3}" authorId="{9B3E8C50-9F58-5237-7C41-C721E3BAA428}" created="2025-09-23T19:58:43.194">
-    <pc:sldMkLst xmlns:pc="http://schemas.microsoft.com/office/powerpoint/2013/main/command">
-      <pc:docMk/>
-      <pc:sldMk cId="2716942079" sldId="269"/>
-    </pc:sldMkLst>
-    <p188:txBody>
-      <a:bodyPr/>
-      <a:lstStyle/>
-      <a:p>
-        <a:r>
-          <a:rPr lang="en-US"/>
-          <a:t>Suitable for builders like String, SQL ...</a:t>
-        </a:r>
-      </a:p>
-    </p188:txBody>
-  </p188:cm>
-</p188:cmLst>
-</file>
-
-<file path=ppt/comments/modernComment_114_907869DB.xml><?xml version="1.0" encoding="utf-8"?>
-<p188:cmLst xmlns:a="http://schemas.openxmlformats.org/drawingml/2006/main" xmlns:r="http://schemas.openxmlformats.org/officeDocument/2006/relationships" xmlns:p188="http://schemas.microsoft.com/office/powerpoint/2018/8/main">
-  <p188:cm id="{379A2AB8-9590-644C-B7DA-F735EF506D7F}" authorId="{9B3E8C50-9F58-5237-7C41-C721E3BAA428}" created="2025-09-23T20:21:30.496">
-    <pc:sldMkLst xmlns:pc="http://schemas.microsoft.com/office/powerpoint/2013/main/command">
-      <pc:docMk/>
-      <pc:sldMk cId="2423810523" sldId="276"/>
-    </pc:sldMkLst>
-    <p188:txBody>
-      <a:bodyPr/>
-      <a:lstStyle/>
-      <a:p>
-        <a:r>
-          <a:rPr lang="en-US"/>
-          <a:t>Dependency inversion principle:
-- High-level modules should not import anything from low-level modules. Both should depend on abstractions (e.g., interfaces).
-- Abstractions should not depend on details. Details (concrete implementations) should depend on abstractions.</a:t>
-        </a:r>
-      </a:p>
-    </p188:txBody>
-  </p188:cm>
-</p188:cmLst>
-</file>
-
 <file path=ppt/handoutMasters/handoutMaster1.xml><?xml version="1.0" encoding="utf-8"?>
 <p:handoutMaster xmlns:a="http://schemas.openxmlformats.org/drawingml/2006/main" xmlns:r="http://schemas.openxmlformats.org/officeDocument/2006/relationships" xmlns:p="http://schemas.openxmlformats.org/presentationml/2006/main">
   <p:cSld>
@@ -400,7 +249,7 @@
           <a:p>
             <a:fld id="{14042657-6240-B14B-9F48-F865CB79AC7C}" type="datetimeFigureOut">
               <a:rPr lang="en-US" smtClean="0"/>
-              <a:t>9/23/25</a:t>
+              <a:t>10/5/25</a:t>
             </a:fld>
             <a:endParaRPr lang="en-US"/>
           </a:p>
@@ -584,7 +433,7 @@
           <a:p>
             <a:fld id="{5E6B121A-761B-2742-9D61-65348EACD743}" type="datetimeFigureOut">
               <a:rPr lang="en-US" smtClean="0"/>
-              <a:t>9/23/25</a:t>
+              <a:t>10/5/25</a:t>
             </a:fld>
             <a:endParaRPr lang="en-US"/>
           </a:p>
@@ -855,6 +704,558 @@
 </p:notesMaster>
 </file>
 
+<file path=ppt/notesSlides/notesSlide1.xml><?xml version="1.0" encoding="utf-8"?>
+<p:notes xmlns:a="http://schemas.openxmlformats.org/drawingml/2006/main" xmlns:r="http://schemas.openxmlformats.org/officeDocument/2006/relationships" xmlns:p="http://schemas.openxmlformats.org/presentationml/2006/main">
+  <p:cSld>
+    <p:spTree>
+      <p:nvGrpSpPr>
+        <p:cNvPr id="1" name=""/>
+        <p:cNvGrpSpPr/>
+        <p:nvPr/>
+      </p:nvGrpSpPr>
+      <p:grpSpPr>
+        <a:xfrm>
+          <a:off x="0" y="0"/>
+          <a:ext cx="0" cy="0"/>
+          <a:chOff x="0" y="0"/>
+          <a:chExt cx="0" cy="0"/>
+        </a:xfrm>
+      </p:grpSpPr>
+      <p:sp>
+        <p:nvSpPr>
+          <p:cNvPr id="2" name="Slide Image Placeholder 1"/>
+          <p:cNvSpPr>
+            <a:spLocks noGrp="1" noRot="1" noChangeAspect="1"/>
+          </p:cNvSpPr>
+          <p:nvPr>
+            <p:ph type="sldImg"/>
+          </p:nvPr>
+        </p:nvSpPr>
+        <p:spPr/>
+      </p:sp>
+      <p:sp>
+        <p:nvSpPr>
+          <p:cNvPr id="3" name="Notes Placeholder 2"/>
+          <p:cNvSpPr>
+            <a:spLocks noGrp="1"/>
+          </p:cNvSpPr>
+          <p:nvPr>
+            <p:ph type="body" idx="1"/>
+          </p:nvPr>
+        </p:nvSpPr>
+        <p:spPr/>
+        <p:txBody>
+          <a:bodyPr/>
+          <a:lstStyle/>
+          <a:p>
+            <a:endParaRPr lang="en-US"/>
+          </a:p>
+        </p:txBody>
+      </p:sp>
+    </p:spTree>
+    <p:extLst>
+      <p:ext uri="{BB962C8B-B14F-4D97-AF65-F5344CB8AC3E}">
+        <p14:creationId xmlns:p14="http://schemas.microsoft.com/office/powerpoint/2010/main" val="2397046218"/>
+      </p:ext>
+    </p:extLst>
+  </p:cSld>
+  <p:clrMapOvr>
+    <a:masterClrMapping/>
+  </p:clrMapOvr>
+</p:notes>
+</file>
+
+<file path=ppt/notesSlides/notesSlide2.xml><?xml version="1.0" encoding="utf-8"?>
+<p:notes xmlns:a="http://schemas.openxmlformats.org/drawingml/2006/main" xmlns:r="http://schemas.openxmlformats.org/officeDocument/2006/relationships" xmlns:p="http://schemas.openxmlformats.org/presentationml/2006/main">
+  <p:cSld>
+    <p:spTree>
+      <p:nvGrpSpPr>
+        <p:cNvPr id="1" name=""/>
+        <p:cNvGrpSpPr/>
+        <p:nvPr/>
+      </p:nvGrpSpPr>
+      <p:grpSpPr>
+        <a:xfrm>
+          <a:off x="0" y="0"/>
+          <a:ext cx="0" cy="0"/>
+          <a:chOff x="0" y="0"/>
+          <a:chExt cx="0" cy="0"/>
+        </a:xfrm>
+      </p:grpSpPr>
+      <p:sp>
+        <p:nvSpPr>
+          <p:cNvPr id="2" name="Slide Image Placeholder 1"/>
+          <p:cNvSpPr>
+            <a:spLocks noGrp="1" noRot="1" noChangeAspect="1"/>
+          </p:cNvSpPr>
+          <p:nvPr>
+            <p:ph type="sldImg"/>
+          </p:nvPr>
+        </p:nvSpPr>
+        <p:spPr/>
+      </p:sp>
+      <p:sp>
+        <p:nvSpPr>
+          <p:cNvPr id="3" name="Notes Placeholder 2"/>
+          <p:cNvSpPr>
+            <a:spLocks noGrp="1"/>
+          </p:cNvSpPr>
+          <p:nvPr>
+            <p:ph type="body" idx="1"/>
+          </p:nvPr>
+        </p:nvSpPr>
+        <p:spPr/>
+        <p:txBody>
+          <a:bodyPr/>
+          <a:lstStyle/>
+          <a:p>
+            <a:endParaRPr lang="en-US"/>
+          </a:p>
+        </p:txBody>
+      </p:sp>
+    </p:spTree>
+    <p:extLst>
+      <p:ext uri="{BB962C8B-B14F-4D97-AF65-F5344CB8AC3E}">
+        <p14:creationId xmlns:p14="http://schemas.microsoft.com/office/powerpoint/2010/main" val="41282351"/>
+      </p:ext>
+    </p:extLst>
+  </p:cSld>
+  <p:clrMapOvr>
+    <a:masterClrMapping/>
+  </p:clrMapOvr>
+</p:notes>
+</file>
+
+<file path=ppt/notesSlides/notesSlide3.xml><?xml version="1.0" encoding="utf-8"?>
+<p:notes xmlns:a="http://schemas.openxmlformats.org/drawingml/2006/main" xmlns:r="http://schemas.openxmlformats.org/officeDocument/2006/relationships" xmlns:p="http://schemas.openxmlformats.org/presentationml/2006/main">
+  <p:cSld>
+    <p:spTree>
+      <p:nvGrpSpPr>
+        <p:cNvPr id="1" name=""/>
+        <p:cNvGrpSpPr/>
+        <p:nvPr/>
+      </p:nvGrpSpPr>
+      <p:grpSpPr>
+        <a:xfrm>
+          <a:off x="0" y="0"/>
+          <a:ext cx="0" cy="0"/>
+          <a:chOff x="0" y="0"/>
+          <a:chExt cx="0" cy="0"/>
+        </a:xfrm>
+      </p:grpSpPr>
+      <p:sp>
+        <p:nvSpPr>
+          <p:cNvPr id="2" name="Slide Image Placeholder 1"/>
+          <p:cNvSpPr>
+            <a:spLocks noGrp="1" noRot="1" noChangeAspect="1"/>
+          </p:cNvSpPr>
+          <p:nvPr>
+            <p:ph type="sldImg"/>
+          </p:nvPr>
+        </p:nvSpPr>
+        <p:spPr/>
+      </p:sp>
+      <p:sp>
+        <p:nvSpPr>
+          <p:cNvPr id="3" name="Notes Placeholder 2"/>
+          <p:cNvSpPr>
+            <a:spLocks noGrp="1"/>
+          </p:cNvSpPr>
+          <p:nvPr>
+            <p:ph type="body" idx="1"/>
+          </p:nvPr>
+        </p:nvSpPr>
+        <p:spPr/>
+        <p:txBody>
+          <a:bodyPr/>
+          <a:lstStyle/>
+          <a:p>
+            <a:r>
+              <a:rPr lang="en-US" sz="1200" kern="1200">
+                <a:solidFill>
+                  <a:schemeClr val="tx1"/>
+                </a:solidFill>
+                <a:effectLst/>
+                <a:latin typeface="+mn-lt"/>
+                <a:ea typeface="+mn-ea"/>
+                <a:cs typeface="+mn-cs"/>
+              </a:rPr>
+              <a:t>C++ or Java used as languages</a:t>
+            </a:r>
+            <a:br>
+              <a:rPr lang="en-US" sz="1200" kern="1200">
+                <a:solidFill>
+                  <a:schemeClr val="tx1"/>
+                </a:solidFill>
+                <a:effectLst/>
+                <a:latin typeface="+mn-lt"/>
+                <a:ea typeface="+mn-ea"/>
+                <a:cs typeface="+mn-cs"/>
+              </a:rPr>
+            </a:br>
+            <a:br>
+              <a:rPr lang="en-US" sz="1200" kern="1200">
+                <a:solidFill>
+                  <a:schemeClr val="tx1"/>
+                </a:solidFill>
+                <a:effectLst/>
+                <a:latin typeface="+mn-lt"/>
+                <a:ea typeface="+mn-ea"/>
+                <a:cs typeface="+mn-cs"/>
+              </a:rPr>
+            </a:br>
+            <a:r>
+              <a:rPr lang="en-US"/>
+              <a:t>Interface assumed as a required concept</a:t>
+            </a:r>
+            <a:br>
+              <a:rPr lang="en-US"/>
+            </a:br>
+            <a:br>
+              <a:rPr lang="en-US"/>
+            </a:br>
+            <a:r>
+              <a:rPr lang="en-US"/>
+              <a:t>Assume no bad references/pointers, no weird coding</a:t>
+            </a:r>
+            <a:br>
+              <a:rPr lang="en-US"/>
+            </a:br>
+            <a:br>
+              <a:rPr lang="en-US"/>
+            </a:br>
+            <a:endParaRPr lang="en-US" sz="1200" kern="1200">
+              <a:solidFill>
+                <a:schemeClr val="tx1"/>
+              </a:solidFill>
+              <a:effectLst/>
+              <a:latin typeface="+mn-lt"/>
+              <a:ea typeface="+mn-ea"/>
+              <a:cs typeface="+mn-cs"/>
+            </a:endParaRPr>
+          </a:p>
+          <a:p>
+            <a:endParaRPr lang="en-US"/>
+          </a:p>
+          <a:p>
+            <a:endParaRPr lang="en-US"/>
+          </a:p>
+        </p:txBody>
+      </p:sp>
+    </p:spTree>
+    <p:extLst>
+      <p:ext uri="{BB962C8B-B14F-4D97-AF65-F5344CB8AC3E}">
+        <p14:creationId xmlns:p14="http://schemas.microsoft.com/office/powerpoint/2010/main" val="589321724"/>
+      </p:ext>
+    </p:extLst>
+  </p:cSld>
+  <p:clrMapOvr>
+    <a:masterClrMapping/>
+  </p:clrMapOvr>
+</p:notes>
+</file>
+
+<file path=ppt/notesSlides/notesSlide4.xml><?xml version="1.0" encoding="utf-8"?>
+<p:notes xmlns:a="http://schemas.openxmlformats.org/drawingml/2006/main" xmlns:r="http://schemas.openxmlformats.org/officeDocument/2006/relationships" xmlns:p="http://schemas.openxmlformats.org/presentationml/2006/main">
+  <p:cSld>
+    <p:spTree>
+      <p:nvGrpSpPr>
+        <p:cNvPr id="1" name=""/>
+        <p:cNvGrpSpPr/>
+        <p:nvPr/>
+      </p:nvGrpSpPr>
+      <p:grpSpPr>
+        <a:xfrm>
+          <a:off x="0" y="0"/>
+          <a:ext cx="0" cy="0"/>
+          <a:chOff x="0" y="0"/>
+          <a:chExt cx="0" cy="0"/>
+        </a:xfrm>
+      </p:grpSpPr>
+      <p:sp>
+        <p:nvSpPr>
+          <p:cNvPr id="2" name="Slide Image Placeholder 1"/>
+          <p:cNvSpPr>
+            <a:spLocks noGrp="1" noRot="1" noChangeAspect="1"/>
+          </p:cNvSpPr>
+          <p:nvPr>
+            <p:ph type="sldImg"/>
+          </p:nvPr>
+        </p:nvSpPr>
+        <p:spPr/>
+      </p:sp>
+      <p:sp>
+        <p:nvSpPr>
+          <p:cNvPr id="3" name="Notes Placeholder 2"/>
+          <p:cNvSpPr>
+            <a:spLocks noGrp="1"/>
+          </p:cNvSpPr>
+          <p:nvPr>
+            <p:ph type="body" idx="1"/>
+          </p:nvPr>
+        </p:nvSpPr>
+        <p:spPr/>
+        <p:txBody>
+          <a:bodyPr/>
+          <a:lstStyle/>
+          <a:p>
+            <a:r>
+              <a:rPr lang="en-US"/>
+              <a:t>Polymorphic creation</a:t>
+            </a:r>
+          </a:p>
+          <a:p>
+            <a:endParaRPr lang="en-US"/>
+          </a:p>
+        </p:txBody>
+      </p:sp>
+    </p:spTree>
+    <p:extLst>
+      <p:ext uri="{BB962C8B-B14F-4D97-AF65-F5344CB8AC3E}">
+        <p14:creationId xmlns:p14="http://schemas.microsoft.com/office/powerpoint/2010/main" val="1398194697"/>
+      </p:ext>
+    </p:extLst>
+  </p:cSld>
+  <p:clrMapOvr>
+    <a:masterClrMapping/>
+  </p:clrMapOvr>
+</p:notes>
+</file>
+
+<file path=ppt/notesSlides/notesSlide5.xml><?xml version="1.0" encoding="utf-8"?>
+<p:notes xmlns:a="http://schemas.openxmlformats.org/drawingml/2006/main" xmlns:r="http://schemas.openxmlformats.org/officeDocument/2006/relationships" xmlns:p="http://schemas.openxmlformats.org/presentationml/2006/main">
+  <p:cSld>
+    <p:spTree>
+      <p:nvGrpSpPr>
+        <p:cNvPr id="1" name=""/>
+        <p:cNvGrpSpPr/>
+        <p:nvPr/>
+      </p:nvGrpSpPr>
+      <p:grpSpPr>
+        <a:xfrm>
+          <a:off x="0" y="0"/>
+          <a:ext cx="0" cy="0"/>
+          <a:chOff x="0" y="0"/>
+          <a:chExt cx="0" cy="0"/>
+        </a:xfrm>
+      </p:grpSpPr>
+      <p:sp>
+        <p:nvSpPr>
+          <p:cNvPr id="2" name="Slide Image Placeholder 1"/>
+          <p:cNvSpPr>
+            <a:spLocks noGrp="1" noRot="1" noChangeAspect="1"/>
+          </p:cNvSpPr>
+          <p:nvPr>
+            <p:ph type="sldImg"/>
+          </p:nvPr>
+        </p:nvSpPr>
+        <p:spPr/>
+      </p:sp>
+      <p:sp>
+        <p:nvSpPr>
+          <p:cNvPr id="3" name="Notes Placeholder 2"/>
+          <p:cNvSpPr>
+            <a:spLocks noGrp="1"/>
+          </p:cNvSpPr>
+          <p:nvPr>
+            <p:ph type="body" idx="1"/>
+          </p:nvPr>
+        </p:nvSpPr>
+        <p:spPr/>
+        <p:txBody>
+          <a:bodyPr/>
+          <a:lstStyle/>
+          <a:p>
+            <a:r>
+              <a:rPr lang="en-US"/>
+              <a:t>Class-creational patterns: Use inheritance to vary the instantiated class (e.g., Factory Method)</a:t>
+            </a:r>
+          </a:p>
+          <a:p>
+            <a:br>
+              <a:rPr lang="en-US"/>
+            </a:br>
+            <a:endParaRPr lang="en-US"/>
+          </a:p>
+          <a:p>
+            <a:r>
+              <a:rPr lang="en-US"/>
+              <a:t>Object-creational patterns: Delegate instantiation to another object (e.g., Abstract Factory, Builder, Prototype, Singleton)</a:t>
+            </a:r>
+          </a:p>
+          <a:p>
+            <a:endParaRPr lang="en-US"/>
+          </a:p>
+        </p:txBody>
+      </p:sp>
+    </p:spTree>
+    <p:extLst>
+      <p:ext uri="{BB962C8B-B14F-4D97-AF65-F5344CB8AC3E}">
+        <p14:creationId xmlns:p14="http://schemas.microsoft.com/office/powerpoint/2010/main" val="911204557"/>
+      </p:ext>
+    </p:extLst>
+  </p:cSld>
+  <p:clrMapOvr>
+    <a:masterClrMapping/>
+  </p:clrMapOvr>
+</p:notes>
+</file>
+
+<file path=ppt/notesSlides/notesSlide6.xml><?xml version="1.0" encoding="utf-8"?>
+<p:notes xmlns:a="http://schemas.openxmlformats.org/drawingml/2006/main" xmlns:r="http://schemas.openxmlformats.org/officeDocument/2006/relationships" xmlns:p="http://schemas.openxmlformats.org/presentationml/2006/main">
+  <p:cSld>
+    <p:spTree>
+      <p:nvGrpSpPr>
+        <p:cNvPr id="1" name=""/>
+        <p:cNvGrpSpPr/>
+        <p:nvPr/>
+      </p:nvGrpSpPr>
+      <p:grpSpPr>
+        <a:xfrm>
+          <a:off x="0" y="0"/>
+          <a:ext cx="0" cy="0"/>
+          <a:chOff x="0" y="0"/>
+          <a:chExt cx="0" cy="0"/>
+        </a:xfrm>
+      </p:grpSpPr>
+      <p:sp>
+        <p:nvSpPr>
+          <p:cNvPr id="2" name="Slide Image Placeholder 1"/>
+          <p:cNvSpPr>
+            <a:spLocks noGrp="1" noRot="1" noChangeAspect="1"/>
+          </p:cNvSpPr>
+          <p:nvPr>
+            <p:ph type="sldImg"/>
+          </p:nvPr>
+        </p:nvSpPr>
+        <p:spPr/>
+      </p:sp>
+      <p:sp>
+        <p:nvSpPr>
+          <p:cNvPr id="3" name="Notes Placeholder 2"/>
+          <p:cNvSpPr>
+            <a:spLocks noGrp="1"/>
+          </p:cNvSpPr>
+          <p:nvPr>
+            <p:ph type="body" idx="1"/>
+          </p:nvPr>
+        </p:nvSpPr>
+        <p:spPr/>
+        <p:txBody>
+          <a:bodyPr/>
+          <a:lstStyle/>
+          <a:p>
+            <a:r>
+              <a:rPr lang="en-US"/>
+              <a:t>Suitable for builders like String, SQL ...</a:t>
+            </a:r>
+          </a:p>
+        </p:txBody>
+      </p:sp>
+    </p:spTree>
+    <p:extLst>
+      <p:ext uri="{BB962C8B-B14F-4D97-AF65-F5344CB8AC3E}">
+        <p14:creationId xmlns:p14="http://schemas.microsoft.com/office/powerpoint/2010/main" val="4193056527"/>
+      </p:ext>
+    </p:extLst>
+  </p:cSld>
+  <p:clrMapOvr>
+    <a:masterClrMapping/>
+  </p:clrMapOvr>
+</p:notes>
+</file>
+
+<file path=ppt/notesSlides/notesSlide7.xml><?xml version="1.0" encoding="utf-8"?>
+<p:notes xmlns:a="http://schemas.openxmlformats.org/drawingml/2006/main" xmlns:r="http://schemas.openxmlformats.org/officeDocument/2006/relationships" xmlns:p="http://schemas.openxmlformats.org/presentationml/2006/main">
+  <p:cSld>
+    <p:spTree>
+      <p:nvGrpSpPr>
+        <p:cNvPr id="1" name=""/>
+        <p:cNvGrpSpPr/>
+        <p:nvPr/>
+      </p:nvGrpSpPr>
+      <p:grpSpPr>
+        <a:xfrm>
+          <a:off x="0" y="0"/>
+          <a:ext cx="0" cy="0"/>
+          <a:chOff x="0" y="0"/>
+          <a:chExt cx="0" cy="0"/>
+        </a:xfrm>
+      </p:grpSpPr>
+      <p:sp>
+        <p:nvSpPr>
+          <p:cNvPr id="2" name="Slide Image Placeholder 1"/>
+          <p:cNvSpPr>
+            <a:spLocks noGrp="1" noRot="1" noChangeAspect="1"/>
+          </p:cNvSpPr>
+          <p:nvPr>
+            <p:ph type="sldImg"/>
+          </p:nvPr>
+        </p:nvSpPr>
+        <p:spPr/>
+      </p:sp>
+      <p:sp>
+        <p:nvSpPr>
+          <p:cNvPr id="3" name="Notes Placeholder 2"/>
+          <p:cNvSpPr>
+            <a:spLocks noGrp="1"/>
+          </p:cNvSpPr>
+          <p:nvPr>
+            <p:ph type="body" idx="1"/>
+          </p:nvPr>
+        </p:nvSpPr>
+        <p:spPr/>
+        <p:txBody>
+          <a:bodyPr/>
+          <a:lstStyle/>
+          <a:p>
+            <a:r>
+              <a:rPr lang="en-US"/>
+              <a:t>Dependency inversion principle:</a:t>
+            </a:r>
+          </a:p>
+          <a:p>
+            <a:br>
+              <a:rPr lang="en-US"/>
+            </a:br>
+            <a:endParaRPr lang="en-US"/>
+          </a:p>
+          <a:p>
+            <a:r>
+              <a:rPr lang="en-US"/>
+              <a:t>- High-level modules should not import anything from low-level modules. Both should depend on abstractions (e.g., interfaces).</a:t>
+            </a:r>
+          </a:p>
+          <a:p>
+            <a:br>
+              <a:rPr lang="en-US"/>
+            </a:br>
+            <a:endParaRPr lang="en-US"/>
+          </a:p>
+          <a:p>
+            <a:r>
+              <a:rPr lang="en-US"/>
+              <a:t>- Abstractions should not depend on details. Details (concrete implementations) should depend on abstractions.</a:t>
+            </a:r>
+          </a:p>
+          <a:p>
+            <a:endParaRPr lang="en-US"/>
+          </a:p>
+        </p:txBody>
+      </p:sp>
+    </p:spTree>
+    <p:extLst>
+      <p:ext uri="{BB962C8B-B14F-4D97-AF65-F5344CB8AC3E}">
+        <p14:creationId xmlns:p14="http://schemas.microsoft.com/office/powerpoint/2010/main" val="2010379484"/>
+      </p:ext>
+    </p:extLst>
+  </p:cSld>
+  <p:clrMapOvr>
+    <a:masterClrMapping/>
+  </p:clrMapOvr>
+</p:notes>
+</file>
+
 <file path=ppt/slideLayouts/slideLayout1.xml><?xml version="1.0" encoding="utf-8"?>
 <p:sldLayout xmlns:a="http://schemas.openxmlformats.org/drawingml/2006/main" xmlns:r="http://schemas.openxmlformats.org/officeDocument/2006/relationships" xmlns:p="http://schemas.openxmlformats.org/presentationml/2006/main" type="title" preserve="1">
   <p:cSld name="Title Slide">
@@ -1002,7 +1403,7 @@
           <a:p>
             <a:fld id="{52F91D9C-0601-5D42-8B8D-DCFBD9D05C94}" type="datetime1">
               <a:rPr lang="en-US" smtClean="0"/>
-              <a:t>9/23/25</a:t>
+              <a:t>10/5/25</a:t>
             </a:fld>
             <a:endParaRPr lang="en-US"/>
           </a:p>
@@ -1203,7 +1604,7 @@
           <a:p>
             <a:fld id="{BDB1F47A-B24C-FA4E-B299-06FB55EED79C}" type="datetime1">
               <a:rPr lang="en-US" smtClean="0"/>
-              <a:t>9/23/25</a:t>
+              <a:t>10/5/25</a:t>
             </a:fld>
             <a:endParaRPr lang="en-US"/>
           </a:p>
@@ -1414,7 +1815,7 @@
           <a:p>
             <a:fld id="{D66607D0-3F2D-A44A-8C33-578D663A4C44}" type="datetime1">
               <a:rPr lang="en-US" smtClean="0"/>
-              <a:t>9/23/25</a:t>
+              <a:t>10/5/25</a:t>
             </a:fld>
             <a:endParaRPr lang="en-US"/>
           </a:p>
@@ -1615,7 +2016,7 @@
           <a:p>
             <a:fld id="{85C1C9C2-378C-444F-A487-FF0C4268D670}" type="datetime1">
               <a:rPr lang="en-US" smtClean="0"/>
-              <a:t>9/23/25</a:t>
+              <a:t>10/5/25</a:t>
             </a:fld>
             <a:endParaRPr lang="en-US"/>
           </a:p>
@@ -1893,7 +2294,7 @@
           <a:p>
             <a:fld id="{DC2A663F-FC84-FB47-A386-B85790FA095A}" type="datetime1">
               <a:rPr lang="en-US" smtClean="0"/>
-              <a:t>9/23/25</a:t>
+              <a:t>10/5/25</a:t>
             </a:fld>
             <a:endParaRPr lang="en-US"/>
           </a:p>
@@ -2161,7 +2562,7 @@
           <a:p>
             <a:fld id="{659743C0-90ED-6F40-884C-8787FA54AE86}" type="datetime1">
               <a:rPr lang="en-US" smtClean="0"/>
-              <a:t>9/23/25</a:t>
+              <a:t>10/5/25</a:t>
             </a:fld>
             <a:endParaRPr lang="en-US"/>
           </a:p>
@@ -2576,7 +2977,7 @@
           <a:p>
             <a:fld id="{302C7985-9557-1741-9BFA-3986E3D51ED1}" type="datetime1">
               <a:rPr lang="en-US" smtClean="0"/>
-              <a:t>9/23/25</a:t>
+              <a:t>10/5/25</a:t>
             </a:fld>
             <a:endParaRPr lang="en-US"/>
           </a:p>
@@ -2720,7 +3121,7 @@
           <a:p>
             <a:fld id="{FE588C32-29E3-344D-8CFF-9416938DC79C}" type="datetime1">
               <a:rPr lang="en-US" smtClean="0"/>
-              <a:t>9/23/25</a:t>
+              <a:t>10/5/25</a:t>
             </a:fld>
             <a:endParaRPr lang="en-US"/>
           </a:p>
@@ -2836,7 +3237,7 @@
           <a:p>
             <a:fld id="{567DD74C-5964-B346-BAD1-958DE16B7DC4}" type="datetime1">
               <a:rPr lang="en-US" smtClean="0"/>
-              <a:t>9/23/25</a:t>
+              <a:t>10/5/25</a:t>
             </a:fld>
             <a:endParaRPr lang="en-US"/>
           </a:p>
@@ -3150,7 +3551,7 @@
           <a:p>
             <a:fld id="{9E3F6121-EA2F-D541-94CD-D21B986B056B}" type="datetime1">
               <a:rPr lang="en-US" smtClean="0"/>
-              <a:t>9/23/25</a:t>
+              <a:t>10/5/25</a:t>
             </a:fld>
             <a:endParaRPr lang="en-US"/>
           </a:p>
@@ -3441,7 +3842,7 @@
           <a:p>
             <a:fld id="{027D362C-6DA5-FA4C-8ADB-A72D7AD50DB1}" type="datetime1">
               <a:rPr lang="en-US" smtClean="0"/>
-              <a:t>9/23/25</a:t>
+              <a:t>10/5/25</a:t>
             </a:fld>
             <a:endParaRPr lang="en-US"/>
           </a:p>
@@ -3685,7 +4086,7 @@
           <a:p>
             <a:fld id="{F67A6921-12F9-AD4F-B76D-2D0707F8B6BD}" type="datetime1">
               <a:rPr lang="en-US" smtClean="0"/>
-              <a:t>9/23/25</a:t>
+              <a:t>10/5/25</a:t>
             </a:fld>
             <a:endParaRPr lang="en-US"/>
           </a:p>
@@ -7189,11 +7590,6 @@
       <p:bldP spid="9" grpId="0"/>
     </p:bldLst>
   </p:timing>
-  <p:extLst>
-    <p:ext uri="{6950BFC3-D8DA-4A85-94F7-54DA5524770B}">
-      <p188:commentRel xmlns:p188="http://schemas.microsoft.com/office/powerpoint/2018/8/main" r:id="rId2"/>
-    </p:ext>
-  </p:extLst>
 </p:sld>
 </file>
 
@@ -11856,7 +12252,7 @@
                 <a:ea typeface="Noto Mono for Powerline" panose="020B0609030804020204" pitchFamily="49" charset="0"/>
                 <a:cs typeface="Noto Mono for Powerline" panose="020B0609030804020204" pitchFamily="49" charset="0"/>
               </a:rPr>
-              <a:t>const myCar = new Car(“Maserati”);</a:t>
+              <a:t>const myCar = new Car(”Maserati”);</a:t>
             </a:r>
           </a:p>
           <a:p>
@@ -11889,7 +12285,7 @@
                 <a:ea typeface="Noto Mono for Powerline" panose="020B0609030804020204" pitchFamily="49" charset="0"/>
                 <a:cs typeface="Noto Mono for Powerline" panose="020B0609030804020204" pitchFamily="49" charset="0"/>
               </a:rPr>
-              <a:t>Console.log(myCar.toString()); </a:t>
+              <a:t>console.log(myCar.toString()); </a:t>
             </a:r>
             <a:r>
               <a:rPr lang="en-US" sz="1200" dirty="0">
@@ -14855,11 +15251,6 @@
       <p:bldP spid="12" grpId="0" build="p"/>
     </p:bldLst>
   </p:timing>
-  <p:extLst>
-    <p:ext uri="{6950BFC3-D8DA-4A85-94F7-54DA5524770B}">
-      <p188:commentRel xmlns:p188="http://schemas.microsoft.com/office/powerpoint/2018/8/main" r:id="rId2"/>
-    </p:ext>
-  </p:extLst>
 </p:sld>
 </file>
 
@@ -15193,7 +15584,7 @@
         <p:spPr>
           <a:xfrm>
             <a:off x="535709" y="5083394"/>
-            <a:ext cx="12825947" cy="369332"/>
+            <a:ext cx="11427103" cy="646331"/>
           </a:xfrm>
           <a:prstGeom prst="rect">
             <a:avLst/>
@@ -15216,7 +15607,14 @@
             </a:r>
             <a:r>
               <a:rPr lang="en-US" dirty="0"/>
-              <a:t>how it works and how it fixes the problem, not in terms of a concrete design, but how you fix something “in theory”</a:t>
+              <a:t>how it works and how it fixes the problem, not in terms of a concrete design, but how you fix something</a:t>
+            </a:r>
+            <a:br>
+              <a:rPr lang="en-US" dirty="0"/>
+            </a:br>
+            <a:r>
+              <a:rPr lang="en-US" dirty="0"/>
+              <a:t>“in theory”</a:t>
             </a:r>
           </a:p>
         </p:txBody>
@@ -15235,7 +15633,7 @@
         </p:nvSpPr>
         <p:spPr>
           <a:xfrm>
-            <a:off x="535709" y="5719872"/>
+            <a:off x="535709" y="5962167"/>
             <a:ext cx="5774979" cy="369332"/>
           </a:xfrm>
           <a:prstGeom prst="rect">
@@ -16257,11 +16655,6 @@
       <p:bldP spid="11" grpId="0"/>
     </p:bldLst>
   </p:timing>
-  <p:extLst>
-    <p:ext uri="{6950BFC3-D8DA-4A85-94F7-54DA5524770B}">
-      <p188:commentRel xmlns:p188="http://schemas.microsoft.com/office/powerpoint/2018/8/main" r:id="rId2"/>
-    </p:ext>
-  </p:extLst>
 </p:sld>
 </file>
 
@@ -16828,11 +17221,6 @@
       <p:bldP spid="5" grpId="0" build="p"/>
     </p:bldLst>
   </p:timing>
-  <p:extLst>
-    <p:ext uri="{6950BFC3-D8DA-4A85-94F7-54DA5524770B}">
-      <p188:commentRel xmlns:p188="http://schemas.microsoft.com/office/powerpoint/2018/8/main" r:id="rId2"/>
-    </p:ext>
-  </p:extLst>
 </p:sld>
 </file>
 
@@ -18302,11 +18690,6 @@
       <p:bldP spid="27" grpId="0"/>
     </p:bldLst>
   </p:timing>
-  <p:extLst>
-    <p:ext uri="{6950BFC3-D8DA-4A85-94F7-54DA5524770B}">
-      <p188:commentRel xmlns:p188="http://schemas.microsoft.com/office/powerpoint/2018/8/main" r:id="rId2"/>
-    </p:ext>
-  </p:extLst>
 </p:sld>
 </file>
 

</xml_diff>